<commit_message>
add grid search results
</commit_message>
<xml_diff>
--- a/Exercise_4/presentation.pptx
+++ b/Exercise_4/presentation.pptx
@@ -5,10 +5,10 @@
     <p:sldMasterId id="2147483648" r:id="rId1"/>
   </p:sldMasterIdLst>
   <p:notesMasterIdLst>
-    <p:notesMasterId r:id="rId14"/>
+    <p:notesMasterId r:id="rId16"/>
   </p:notesMasterIdLst>
   <p:handoutMasterIdLst>
-    <p:handoutMasterId r:id="rId15"/>
+    <p:handoutMasterId r:id="rId17"/>
   </p:handoutMasterIdLst>
   <p:sldIdLst>
     <p:sldId id="256" r:id="rId2"/>
@@ -19,10 +19,12 @@
     <p:sldId id="264" r:id="rId7"/>
     <p:sldId id="269" r:id="rId8"/>
     <p:sldId id="272" r:id="rId9"/>
-    <p:sldId id="273" r:id="rId10"/>
-    <p:sldId id="258" r:id="rId11"/>
-    <p:sldId id="270" r:id="rId12"/>
-    <p:sldId id="271" r:id="rId13"/>
+    <p:sldId id="274" r:id="rId10"/>
+    <p:sldId id="273" r:id="rId11"/>
+    <p:sldId id="258" r:id="rId12"/>
+    <p:sldId id="275" r:id="rId13"/>
+    <p:sldId id="270" r:id="rId14"/>
+    <p:sldId id="271" r:id="rId15"/>
   </p:sldIdLst>
   <p:sldSz cx="10080625" cy="7559675"/>
   <p:notesSz cx="7559675" cy="10691813"/>
@@ -955,7 +957,7 @@
           <p:cNvPr id="7" name="Foliennummernplatzhalter 6">
             <a:extLst>
               <a:ext uri="{FF2B5EF4-FFF2-40B4-BE49-F238E27FC236}">
-                <a16:creationId xmlns:a16="http://schemas.microsoft.com/office/drawing/2014/main" id="{5EDE0806-B982-4A0A-8483-9FA68FB5C98C}"/>
+                <a16:creationId xmlns:a16="http://schemas.microsoft.com/office/drawing/2014/main" id="{44EC89B4-CA93-4D45-839B-2A01018E3B97}"/>
               </a:ext>
             </a:extLst>
           </p:cNvPr>
@@ -976,7 +978,7 @@
           <a:lstStyle/>
           <a:p>
             <a:pPr lvl="0"/>
-            <a:fld id="{6482543A-D1F8-4E28-A13F-13EE632CBE0A}" type="slidenum">
+            <a:fld id="{3C8E01BB-7E90-4F3B-A1BE-2874FDDB04D8}" type="slidenum">
               <a:t>10</a:t>
             </a:fld>
             <a:endParaRPr lang="en-US"/>
@@ -988,7 +990,7 @@
           <p:cNvPr id="2" name="Folienbildplatzhalter 1">
             <a:extLst>
               <a:ext uri="{FF2B5EF4-FFF2-40B4-BE49-F238E27FC236}">
-                <a16:creationId xmlns:a16="http://schemas.microsoft.com/office/drawing/2014/main" id="{C3EEF3BB-8F0B-4451-8F83-8E5D748B7DEF}"/>
+                <a16:creationId xmlns:a16="http://schemas.microsoft.com/office/drawing/2014/main" id="{529499F4-C569-4871-B59C-750229A96602}"/>
               </a:ext>
             </a:extLst>
           </p:cNvPr>
@@ -1020,7 +1022,7 @@
           <p:cNvPr id="3" name="Notizenplatzhalter 2">
             <a:extLst>
               <a:ext uri="{FF2B5EF4-FFF2-40B4-BE49-F238E27FC236}">
-                <a16:creationId xmlns:a16="http://schemas.microsoft.com/office/drawing/2014/main" id="{AB5FD366-3B59-4A65-92B3-6573459D13D0}"/>
+                <a16:creationId xmlns:a16="http://schemas.microsoft.com/office/drawing/2014/main" id="{81E7C8BE-B1CF-48F2-9BC3-AC9AA709A482}"/>
               </a:ext>
             </a:extLst>
           </p:cNvPr>
@@ -1041,6 +1043,11 @@
         </p:txBody>
       </p:sp>
     </p:spTree>
+    <p:extLst>
+      <p:ext uri="{BB962C8B-B14F-4D97-AF65-F5344CB8AC3E}">
+        <p14:creationId xmlns:p14="http://schemas.microsoft.com/office/powerpoint/2010/main" val="3063718476"/>
+      </p:ext>
+    </p:extLst>
   </p:cSld>
   <p:clrMapOvr>
     <a:masterClrMapping/>
@@ -1070,7 +1077,7 @@
           <p:cNvPr id="7" name="Foliennummernplatzhalter 6">
             <a:extLst>
               <a:ext uri="{FF2B5EF4-FFF2-40B4-BE49-F238E27FC236}">
-                <a16:creationId xmlns:a16="http://schemas.microsoft.com/office/drawing/2014/main" id="{44EC89B4-CA93-4D45-839B-2A01018E3B97}"/>
+                <a16:creationId xmlns:a16="http://schemas.microsoft.com/office/drawing/2014/main" id="{5EDE0806-B982-4A0A-8483-9FA68FB5C98C}"/>
               </a:ext>
             </a:extLst>
           </p:cNvPr>
@@ -1091,7 +1098,7 @@
           <a:lstStyle/>
           <a:p>
             <a:pPr lvl="0"/>
-            <a:fld id="{3C8E01BB-7E90-4F3B-A1BE-2874FDDB04D8}" type="slidenum">
+            <a:fld id="{6482543A-D1F8-4E28-A13F-13EE632CBE0A}" type="slidenum">
               <a:t>11</a:t>
             </a:fld>
             <a:endParaRPr lang="en-US"/>
@@ -1103,7 +1110,7 @@
           <p:cNvPr id="2" name="Folienbildplatzhalter 1">
             <a:extLst>
               <a:ext uri="{FF2B5EF4-FFF2-40B4-BE49-F238E27FC236}">
-                <a16:creationId xmlns:a16="http://schemas.microsoft.com/office/drawing/2014/main" id="{529499F4-C569-4871-B59C-750229A96602}"/>
+                <a16:creationId xmlns:a16="http://schemas.microsoft.com/office/drawing/2014/main" id="{C3EEF3BB-8F0B-4451-8F83-8E5D748B7DEF}"/>
               </a:ext>
             </a:extLst>
           </p:cNvPr>
@@ -1135,7 +1142,7 @@
           <p:cNvPr id="3" name="Notizenplatzhalter 2">
             <a:extLst>
               <a:ext uri="{FF2B5EF4-FFF2-40B4-BE49-F238E27FC236}">
-                <a16:creationId xmlns:a16="http://schemas.microsoft.com/office/drawing/2014/main" id="{81E7C8BE-B1CF-48F2-9BC3-AC9AA709A482}"/>
+                <a16:creationId xmlns:a16="http://schemas.microsoft.com/office/drawing/2014/main" id="{AB5FD366-3B59-4A65-92B3-6573459D13D0}"/>
               </a:ext>
             </a:extLst>
           </p:cNvPr>
@@ -1156,11 +1163,6 @@
         </p:txBody>
       </p:sp>
     </p:spTree>
-    <p:extLst>
-      <p:ext uri="{BB962C8B-B14F-4D97-AF65-F5344CB8AC3E}">
-        <p14:creationId xmlns:p14="http://schemas.microsoft.com/office/powerpoint/2010/main" val="2370177172"/>
-      </p:ext>
-    </p:extLst>
   </p:cSld>
   <p:clrMapOvr>
     <a:masterClrMapping/>
@@ -1190,7 +1192,7 @@
           <p:cNvPr id="7" name="Foliennummernplatzhalter 6">
             <a:extLst>
               <a:ext uri="{FF2B5EF4-FFF2-40B4-BE49-F238E27FC236}">
-                <a16:creationId xmlns:a16="http://schemas.microsoft.com/office/drawing/2014/main" id="{44EC89B4-CA93-4D45-839B-2A01018E3B97}"/>
+                <a16:creationId xmlns:a16="http://schemas.microsoft.com/office/drawing/2014/main" id="{5EDE0806-B982-4A0A-8483-9FA68FB5C98C}"/>
               </a:ext>
             </a:extLst>
           </p:cNvPr>
@@ -1211,8 +1213,248 @@
           <a:lstStyle/>
           <a:p>
             <a:pPr lvl="0"/>
+            <a:fld id="{6482543A-D1F8-4E28-A13F-13EE632CBE0A}" type="slidenum">
+              <a:t>12</a:t>
+            </a:fld>
+            <a:endParaRPr lang="en-US"/>
+          </a:p>
+        </p:txBody>
+      </p:sp>
+      <p:sp>
+        <p:nvSpPr>
+          <p:cNvPr id="2" name="Folienbildplatzhalter 1">
+            <a:extLst>
+              <a:ext uri="{FF2B5EF4-FFF2-40B4-BE49-F238E27FC236}">
+                <a16:creationId xmlns:a16="http://schemas.microsoft.com/office/drawing/2014/main" id="{C3EEF3BB-8F0B-4451-8F83-8E5D748B7DEF}"/>
+              </a:ext>
+            </a:extLst>
+          </p:cNvPr>
+          <p:cNvSpPr>
+            <a:spLocks noGrp="1" noRot="1" noChangeAspect="1" noResize="1"/>
+          </p:cNvSpPr>
+          <p:nvPr>
+            <p:ph type="sldImg"/>
+          </p:nvPr>
+        </p:nvSpPr>
+        <p:spPr>
+          <a:xfrm>
+            <a:off x="1106488" y="812800"/>
+            <a:ext cx="5345112" cy="4008438"/>
+          </a:xfrm>
+          <a:solidFill>
+            <a:srgbClr val="729FCF"/>
+          </a:solidFill>
+          <a:ln w="25400">
+            <a:solidFill>
+              <a:srgbClr val="3465A4"/>
+            </a:solidFill>
+            <a:prstDash val="solid"/>
+          </a:ln>
+        </p:spPr>
+      </p:sp>
+      <p:sp>
+        <p:nvSpPr>
+          <p:cNvPr id="3" name="Notizenplatzhalter 2">
+            <a:extLst>
+              <a:ext uri="{FF2B5EF4-FFF2-40B4-BE49-F238E27FC236}">
+                <a16:creationId xmlns:a16="http://schemas.microsoft.com/office/drawing/2014/main" id="{AB5FD366-3B59-4A65-92B3-6573459D13D0}"/>
+              </a:ext>
+            </a:extLst>
+          </p:cNvPr>
+          <p:cNvSpPr txBox="1">
+            <a:spLocks noGrp="1"/>
+          </p:cNvSpPr>
+          <p:nvPr>
+            <p:ph type="body" sz="quarter" idx="1"/>
+          </p:nvPr>
+        </p:nvSpPr>
+        <p:spPr/>
+        <p:txBody>
+          <a:bodyPr/>
+          <a:lstStyle/>
+          <a:p>
+            <a:endParaRPr lang="en-US"/>
+          </a:p>
+        </p:txBody>
+      </p:sp>
+    </p:spTree>
+    <p:extLst>
+      <p:ext uri="{BB962C8B-B14F-4D97-AF65-F5344CB8AC3E}">
+        <p14:creationId xmlns:p14="http://schemas.microsoft.com/office/powerpoint/2010/main" val="1984932483"/>
+      </p:ext>
+    </p:extLst>
+  </p:cSld>
+  <p:clrMapOvr>
+    <a:masterClrMapping/>
+  </p:clrMapOvr>
+</p:notes>
+</file>
+
+<file path=ppt/notesSlides/notesSlide13.xml><?xml version="1.0" encoding="utf-8"?>
+<p:notes xmlns:a="http://schemas.openxmlformats.org/drawingml/2006/main" xmlns:r="http://schemas.openxmlformats.org/officeDocument/2006/relationships" xmlns:p="http://schemas.openxmlformats.org/presentationml/2006/main">
+  <p:cSld>
+    <p:spTree>
+      <p:nvGrpSpPr>
+        <p:cNvPr id="1" name=""/>
+        <p:cNvGrpSpPr/>
+        <p:nvPr/>
+      </p:nvGrpSpPr>
+      <p:grpSpPr>
+        <a:xfrm>
+          <a:off x="0" y="0"/>
+          <a:ext cx="0" cy="0"/>
+          <a:chOff x="0" y="0"/>
+          <a:chExt cx="0" cy="0"/>
+        </a:xfrm>
+      </p:grpSpPr>
+      <p:sp>
+        <p:nvSpPr>
+          <p:cNvPr id="7" name="Foliennummernplatzhalter 6">
+            <a:extLst>
+              <a:ext uri="{FF2B5EF4-FFF2-40B4-BE49-F238E27FC236}">
+                <a16:creationId xmlns:a16="http://schemas.microsoft.com/office/drawing/2014/main" id="{44EC89B4-CA93-4D45-839B-2A01018E3B97}"/>
+              </a:ext>
+            </a:extLst>
+          </p:cNvPr>
+          <p:cNvSpPr txBox="1">
+            <a:spLocks noGrp="1"/>
+          </p:cNvSpPr>
+          <p:nvPr>
+            <p:ph type="sldNum" sz="quarter" idx="5"/>
+          </p:nvPr>
+        </p:nvSpPr>
+        <p:spPr>
+          <a:ln/>
+        </p:spPr>
+        <p:txBody>
+          <a:bodyPr lIns="0" tIns="0" rIns="0" bIns="0" anchor="b" anchorCtr="0">
+            <a:noAutofit/>
+          </a:bodyPr>
+          <a:lstStyle/>
+          <a:p>
+            <a:pPr lvl="0"/>
             <a:fld id="{3C8E01BB-7E90-4F3B-A1BE-2874FDDB04D8}" type="slidenum">
-              <a:t>12</a:t>
+              <a:t>13</a:t>
+            </a:fld>
+            <a:endParaRPr lang="en-US"/>
+          </a:p>
+        </p:txBody>
+      </p:sp>
+      <p:sp>
+        <p:nvSpPr>
+          <p:cNvPr id="2" name="Folienbildplatzhalter 1">
+            <a:extLst>
+              <a:ext uri="{FF2B5EF4-FFF2-40B4-BE49-F238E27FC236}">
+                <a16:creationId xmlns:a16="http://schemas.microsoft.com/office/drawing/2014/main" id="{529499F4-C569-4871-B59C-750229A96602}"/>
+              </a:ext>
+            </a:extLst>
+          </p:cNvPr>
+          <p:cNvSpPr>
+            <a:spLocks noGrp="1" noRot="1" noChangeAspect="1" noResize="1"/>
+          </p:cNvSpPr>
+          <p:nvPr>
+            <p:ph type="sldImg"/>
+          </p:nvPr>
+        </p:nvSpPr>
+        <p:spPr>
+          <a:xfrm>
+            <a:off x="1106488" y="812800"/>
+            <a:ext cx="5345112" cy="4008438"/>
+          </a:xfrm>
+          <a:solidFill>
+            <a:srgbClr val="729FCF"/>
+          </a:solidFill>
+          <a:ln w="25400">
+            <a:solidFill>
+              <a:srgbClr val="3465A4"/>
+            </a:solidFill>
+            <a:prstDash val="solid"/>
+          </a:ln>
+        </p:spPr>
+      </p:sp>
+      <p:sp>
+        <p:nvSpPr>
+          <p:cNvPr id="3" name="Notizenplatzhalter 2">
+            <a:extLst>
+              <a:ext uri="{FF2B5EF4-FFF2-40B4-BE49-F238E27FC236}">
+                <a16:creationId xmlns:a16="http://schemas.microsoft.com/office/drawing/2014/main" id="{81E7C8BE-B1CF-48F2-9BC3-AC9AA709A482}"/>
+              </a:ext>
+            </a:extLst>
+          </p:cNvPr>
+          <p:cNvSpPr txBox="1">
+            <a:spLocks noGrp="1"/>
+          </p:cNvSpPr>
+          <p:nvPr>
+            <p:ph type="body" sz="quarter" idx="1"/>
+          </p:nvPr>
+        </p:nvSpPr>
+        <p:spPr/>
+        <p:txBody>
+          <a:bodyPr/>
+          <a:lstStyle/>
+          <a:p>
+            <a:endParaRPr lang="en-US"/>
+          </a:p>
+        </p:txBody>
+      </p:sp>
+    </p:spTree>
+    <p:extLst>
+      <p:ext uri="{BB962C8B-B14F-4D97-AF65-F5344CB8AC3E}">
+        <p14:creationId xmlns:p14="http://schemas.microsoft.com/office/powerpoint/2010/main" val="2370177172"/>
+      </p:ext>
+    </p:extLst>
+  </p:cSld>
+  <p:clrMapOvr>
+    <a:masterClrMapping/>
+  </p:clrMapOvr>
+</p:notes>
+</file>
+
+<file path=ppt/notesSlides/notesSlide14.xml><?xml version="1.0" encoding="utf-8"?>
+<p:notes xmlns:a="http://schemas.openxmlformats.org/drawingml/2006/main" xmlns:r="http://schemas.openxmlformats.org/officeDocument/2006/relationships" xmlns:p="http://schemas.openxmlformats.org/presentationml/2006/main">
+  <p:cSld>
+    <p:spTree>
+      <p:nvGrpSpPr>
+        <p:cNvPr id="1" name=""/>
+        <p:cNvGrpSpPr/>
+        <p:nvPr/>
+      </p:nvGrpSpPr>
+      <p:grpSpPr>
+        <a:xfrm>
+          <a:off x="0" y="0"/>
+          <a:ext cx="0" cy="0"/>
+          <a:chOff x="0" y="0"/>
+          <a:chExt cx="0" cy="0"/>
+        </a:xfrm>
+      </p:grpSpPr>
+      <p:sp>
+        <p:nvSpPr>
+          <p:cNvPr id="7" name="Foliennummernplatzhalter 6">
+            <a:extLst>
+              <a:ext uri="{FF2B5EF4-FFF2-40B4-BE49-F238E27FC236}">
+                <a16:creationId xmlns:a16="http://schemas.microsoft.com/office/drawing/2014/main" id="{44EC89B4-CA93-4D45-839B-2A01018E3B97}"/>
+              </a:ext>
+            </a:extLst>
+          </p:cNvPr>
+          <p:cNvSpPr txBox="1">
+            <a:spLocks noGrp="1"/>
+          </p:cNvSpPr>
+          <p:nvPr>
+            <p:ph type="sldNum" sz="quarter" idx="5"/>
+          </p:nvPr>
+        </p:nvSpPr>
+        <p:spPr>
+          <a:ln/>
+        </p:spPr>
+        <p:txBody>
+          <a:bodyPr lIns="0" tIns="0" rIns="0" bIns="0" anchor="b" anchorCtr="0">
+            <a:noAutofit/>
+          </a:bodyPr>
+          <a:lstStyle/>
+          <a:p>
+            <a:pPr lvl="0"/>
+            <a:fld id="{3C8E01BB-7E90-4F3B-A1BE-2874FDDB04D8}" type="slidenum">
+              <a:t>14</a:t>
             </a:fld>
             <a:endParaRPr lang="en-US"/>
           </a:p>
@@ -2233,7 +2475,7 @@
     </p:spTree>
     <p:extLst>
       <p:ext uri="{BB962C8B-B14F-4D97-AF65-F5344CB8AC3E}">
-        <p14:creationId xmlns:p14="http://schemas.microsoft.com/office/powerpoint/2010/main" val="3063718476"/>
+        <p14:creationId xmlns:p14="http://schemas.microsoft.com/office/powerpoint/2010/main" val="1227185661"/>
       </p:ext>
     </p:extLst>
   </p:cSld>
@@ -5593,6 +5835,364 @@
 
 <file path=ppt/slides/slide10.xml><?xml version="1.0" encoding="utf-8"?>
 <p:sld xmlns:a="http://schemas.openxmlformats.org/drawingml/2006/main" xmlns:r="http://schemas.openxmlformats.org/officeDocument/2006/relationships" xmlns:p="http://schemas.openxmlformats.org/presentationml/2006/main">
+  <p:cSld>
+    <p:spTree>
+      <p:nvGrpSpPr>
+        <p:cNvPr id="1" name=""/>
+        <p:cNvGrpSpPr/>
+        <p:nvPr/>
+      </p:nvGrpSpPr>
+      <p:grpSpPr>
+        <a:xfrm>
+          <a:off x="0" y="0"/>
+          <a:ext cx="0" cy="0"/>
+          <a:chOff x="0" y="0"/>
+          <a:chExt cx="0" cy="0"/>
+        </a:xfrm>
+      </p:grpSpPr>
+      <p:sp>
+        <p:nvSpPr>
+          <p:cNvPr id="3" name="Textplatzhalter 2">
+            <a:extLst>
+              <a:ext uri="{FF2B5EF4-FFF2-40B4-BE49-F238E27FC236}">
+                <a16:creationId xmlns:a16="http://schemas.microsoft.com/office/drawing/2014/main" id="{B46C215E-DCC1-4BE4-A754-094902847F75}"/>
+              </a:ext>
+            </a:extLst>
+          </p:cNvPr>
+          <p:cNvSpPr txBox="1">
+            <a:spLocks noGrp="1"/>
+          </p:cNvSpPr>
+          <p:nvPr>
+            <p:ph type="body" idx="4294967295"/>
+          </p:nvPr>
+        </p:nvSpPr>
+        <p:spPr/>
+        <p:txBody>
+          <a:bodyPr/>
+          <a:lstStyle/>
+          <a:p>
+            <a:pPr marL="457200" indent="-457200">
+              <a:buFontTx/>
+              <a:buChar char="-"/>
+            </a:pPr>
+            <a:r>
+              <a:rPr lang="en-US" dirty="0"/>
+              <a:t>Results grid search #3:</a:t>
+            </a:r>
+          </a:p>
+          <a:p>
+            <a:pPr marL="1028700" lvl="1" indent="-342900">
+              <a:buFont typeface="Wingdings" panose="05000000000000000000" pitchFamily="2" charset="2"/>
+              <a:buChar char="à"/>
+            </a:pPr>
+            <a:r>
+              <a:rPr lang="en-US" dirty="0"/>
+              <a:t>E.g. hyperparameters: k = 7, </a:t>
+            </a:r>
+            <a:r>
+              <a:rPr lang="en-US" dirty="0" err="1"/>
+              <a:t>c_n</a:t>
+            </a:r>
+            <a:r>
+              <a:rPr lang="en-US" dirty="0"/>
+              <a:t> = 3, </a:t>
+            </a:r>
+            <a:r>
+              <a:rPr lang="en-US" dirty="0" err="1"/>
+              <a:t>c_e</a:t>
+            </a:r>
+            <a:r>
+              <a:rPr lang="en-US" dirty="0"/>
+              <a:t> = 2</a:t>
+            </a:r>
+          </a:p>
+          <a:p>
+            <a:pPr marL="1028700" lvl="1" indent="-342900">
+              <a:buFont typeface="Wingdings" panose="05000000000000000000" pitchFamily="2" charset="2"/>
+              <a:buChar char="à"/>
+            </a:pPr>
+            <a:r>
+              <a:rPr lang="en-US" dirty="0"/>
+              <a:t>99.6% </a:t>
+            </a:r>
+            <a:r>
+              <a:rPr lang="de-CH" dirty="0"/>
+              <a:t>a</a:t>
+            </a:r>
+            <a:r>
+              <a:rPr lang="en-US" dirty="0" err="1"/>
+              <a:t>ccuracy</a:t>
+            </a:r>
+            <a:r>
+              <a:rPr lang="en-US" dirty="0"/>
+              <a:t> on valid.txt:</a:t>
+            </a:r>
+          </a:p>
+          <a:p>
+            <a:pPr marL="457200" indent="-457200">
+              <a:buFontTx/>
+              <a:buChar char="-"/>
+            </a:pPr>
+            <a:endParaRPr lang="en-US" dirty="0"/>
+          </a:p>
+          <a:p>
+            <a:endParaRPr lang="en-US" dirty="0"/>
+          </a:p>
+        </p:txBody>
+      </p:sp>
+      <p:sp>
+        <p:nvSpPr>
+          <p:cNvPr id="7" name="Titel 1">
+            <a:extLst>
+              <a:ext uri="{FF2B5EF4-FFF2-40B4-BE49-F238E27FC236}">
+                <a16:creationId xmlns:a16="http://schemas.microsoft.com/office/drawing/2014/main" id="{751113A9-2E3E-4730-BB84-8AA40760EB63}"/>
+              </a:ext>
+            </a:extLst>
+          </p:cNvPr>
+          <p:cNvSpPr txBox="1">
+            <a:spLocks/>
+          </p:cNvSpPr>
+          <p:nvPr/>
+        </p:nvSpPr>
+        <p:spPr>
+          <a:xfrm>
+            <a:off x="503999" y="301320"/>
+            <a:ext cx="9240076" cy="1262160"/>
+          </a:xfrm>
+          <a:prstGeom prst="rect">
+            <a:avLst/>
+          </a:prstGeom>
+          <a:noFill/>
+          <a:ln>
+            <a:noFill/>
+          </a:ln>
+        </p:spPr>
+        <p:txBody>
+          <a:bodyPr lIns="0" tIns="0" rIns="0" bIns="0" anchor="ctr"/>
+          <a:lstStyle>
+            <a:lvl1pPr algn="ctr" rtl="0" hangingPunct="0">
+              <a:tabLst/>
+              <a:defRPr lang="en-US" sz="4400" b="0" i="0" u="none" strike="noStrike" kern="1200" cap="none">
+                <a:ln>
+                  <a:noFill/>
+                </a:ln>
+                <a:highlight>
+                  <a:scrgbClr r="0" g="0" b="0">
+                    <a:alpha val="0"/>
+                  </a:scrgbClr>
+                </a:highlight>
+                <a:latin typeface="Liberation Sans" pitchFamily="18"/>
+              </a:defRPr>
+            </a:lvl1pPr>
+          </a:lstStyle>
+          <a:p>
+            <a:endParaRPr lang="en-US" dirty="0">
+              <a:solidFill>
+                <a:sysClr val="windowText" lastClr="000000"/>
+              </a:solidFill>
+            </a:endParaRPr>
+          </a:p>
+        </p:txBody>
+      </p:sp>
+      <p:pic>
+        <p:nvPicPr>
+          <p:cNvPr id="4" name="Grafik 3">
+            <a:extLst>
+              <a:ext uri="{FF2B5EF4-FFF2-40B4-BE49-F238E27FC236}">
+                <a16:creationId xmlns:a16="http://schemas.microsoft.com/office/drawing/2014/main" id="{A9385369-AC63-44FF-BEAD-6883BEC94279}"/>
+              </a:ext>
+            </a:extLst>
+          </p:cNvPr>
+          <p:cNvPicPr>
+            <a:picLocks noChangeAspect="1"/>
+          </p:cNvPicPr>
+          <p:nvPr/>
+        </p:nvPicPr>
+        <p:blipFill>
+          <a:blip r:embed="rId3">
+            <a:extLst>
+              <a:ext uri="{28A0092B-C50C-407E-A947-70E740481C1C}">
+                <a14:useLocalDpi xmlns:a14="http://schemas.microsoft.com/office/drawing/2010/main" val="0"/>
+              </a:ext>
+            </a:extLst>
+          </a:blip>
+          <a:stretch>
+            <a:fillRect/>
+          </a:stretch>
+        </p:blipFill>
+        <p:spPr>
+          <a:xfrm>
+            <a:off x="5357092" y="3390654"/>
+            <a:ext cx="4620270" cy="3924848"/>
+          </a:xfrm>
+          <a:prstGeom prst="rect">
+            <a:avLst/>
+          </a:prstGeom>
+        </p:spPr>
+      </p:pic>
+      <p:sp>
+        <p:nvSpPr>
+          <p:cNvPr id="6" name="Textfeld 5">
+            <a:extLst>
+              <a:ext uri="{FF2B5EF4-FFF2-40B4-BE49-F238E27FC236}">
+                <a16:creationId xmlns:a16="http://schemas.microsoft.com/office/drawing/2014/main" id="{2DEF6A6B-9E60-4528-9C00-C2C5FA8F4B7D}"/>
+              </a:ext>
+            </a:extLst>
+          </p:cNvPr>
+          <p:cNvSpPr txBox="1"/>
+          <p:nvPr/>
+        </p:nvSpPr>
+        <p:spPr>
+          <a:xfrm>
+            <a:off x="171451" y="3382259"/>
+            <a:ext cx="5129212" cy="3416320"/>
+          </a:xfrm>
+          <a:prstGeom prst="rect">
+            <a:avLst/>
+          </a:prstGeom>
+          <a:solidFill>
+            <a:srgbClr val="FFC000"/>
+          </a:solidFill>
+        </p:spPr>
+        <p:txBody>
+          <a:bodyPr wrap="square" rtlCol="0">
+            <a:spAutoFit/>
+          </a:bodyPr>
+          <a:lstStyle/>
+          <a:p>
+            <a:r>
+              <a:rPr lang="pt-BR" b="1" dirty="0">
+                <a:latin typeface="Courier New" panose="02070309020205020404" pitchFamily="49" charset="0"/>
+                <a:cs typeface="Courier New" panose="02070309020205020404" pitchFamily="49" charset="0"/>
+              </a:rPr>
+              <a:t>&gt; confusionMatrix(t, dnn=c("Prediction", "Ground truth"))</a:t>
+            </a:r>
+          </a:p>
+          <a:p>
+            <a:r>
+              <a:rPr lang="pt-BR" b="1" dirty="0">
+                <a:latin typeface="Courier New" panose="02070309020205020404" pitchFamily="49" charset="0"/>
+                <a:cs typeface="Courier New" panose="02070309020205020404" pitchFamily="49" charset="0"/>
+              </a:rPr>
+              <a:t>Confusion Matrix and Statistics</a:t>
+            </a:r>
+          </a:p>
+          <a:p>
+            <a:r>
+              <a:rPr lang="pt-BR" b="1" dirty="0">
+                <a:latin typeface="Courier New" panose="02070309020205020404" pitchFamily="49" charset="0"/>
+                <a:cs typeface="Courier New" panose="02070309020205020404" pitchFamily="49" charset="0"/>
+              </a:rPr>
+              <a:t>                                </a:t>
+            </a:r>
+          </a:p>
+          <a:p>
+            <a:r>
+              <a:rPr lang="pt-BR" b="1" dirty="0">
+                <a:latin typeface="Courier New" panose="02070309020205020404" pitchFamily="49" charset="0"/>
+                <a:cs typeface="Courier New" panose="02070309020205020404" pitchFamily="49" charset="0"/>
+              </a:rPr>
+              <a:t>                classIdActual</a:t>
+            </a:r>
+          </a:p>
+          <a:p>
+            <a:r>
+              <a:rPr lang="pt-BR" b="1" dirty="0">
+                <a:latin typeface="Courier New" panose="02070309020205020404" pitchFamily="49" charset="0"/>
+                <a:cs typeface="Courier New" panose="02070309020205020404" pitchFamily="49" charset="0"/>
+              </a:rPr>
+              <a:t>classIdPredicted   a   i</a:t>
+            </a:r>
+          </a:p>
+          <a:p>
+            <a:r>
+              <a:rPr lang="pt-BR" b="1" dirty="0">
+                <a:latin typeface="Courier New" panose="02070309020205020404" pitchFamily="49" charset="0"/>
+                <a:cs typeface="Courier New" panose="02070309020205020404" pitchFamily="49" charset="0"/>
+              </a:rPr>
+              <a:t>               a  49   0</a:t>
+            </a:r>
+          </a:p>
+          <a:p>
+            <a:r>
+              <a:rPr lang="pt-BR" b="1" dirty="0">
+                <a:latin typeface="Courier New" panose="02070309020205020404" pitchFamily="49" charset="0"/>
+                <a:cs typeface="Courier New" panose="02070309020205020404" pitchFamily="49" charset="0"/>
+              </a:rPr>
+              <a:t>               i   1 200</a:t>
+            </a:r>
+          </a:p>
+          <a:p>
+            <a:endParaRPr lang="pt-BR" b="1" dirty="0">
+              <a:latin typeface="Courier New" panose="02070309020205020404" pitchFamily="49" charset="0"/>
+              <a:cs typeface="Courier New" panose="02070309020205020404" pitchFamily="49" charset="0"/>
+            </a:endParaRPr>
+          </a:p>
+          <a:p>
+            <a:r>
+              <a:rPr lang="pt-BR" b="1" dirty="0">
+                <a:latin typeface="Courier New" panose="02070309020205020404" pitchFamily="49" charset="0"/>
+                <a:cs typeface="Courier New" panose="02070309020205020404" pitchFamily="49" charset="0"/>
+              </a:rPr>
+              <a:t>		  Accuracy : 0.996 </a:t>
+            </a:r>
+          </a:p>
+          <a:p>
+            <a:r>
+              <a:rPr lang="pt-BR" b="1" dirty="0">
+                <a:latin typeface="Courier New" panose="02070309020205020404" pitchFamily="49" charset="0"/>
+                <a:cs typeface="Courier New" panose="02070309020205020404" pitchFamily="49" charset="0"/>
+              </a:rPr>
+              <a:t>               ....</a:t>
+            </a:r>
+          </a:p>
+          <a:p>
+            <a:r>
+              <a:rPr lang="en-US" b="1" dirty="0" err="1">
+                <a:latin typeface="Courier New" panose="02070309020205020404" pitchFamily="49" charset="0"/>
+                <a:cs typeface="Courier New" panose="02070309020205020404" pitchFamily="49" charset="0"/>
+              </a:rPr>
+              <a:t>fourfoldplot</a:t>
+            </a:r>
+            <a:r>
+              <a:rPr lang="en-US" b="1" dirty="0">
+                <a:latin typeface="Courier New" panose="02070309020205020404" pitchFamily="49" charset="0"/>
+                <a:cs typeface="Courier New" panose="02070309020205020404" pitchFamily="49" charset="0"/>
+              </a:rPr>
+              <a:t>(</a:t>
+            </a:r>
+            <a:r>
+              <a:rPr lang="en-US" b="1" dirty="0" err="1">
+                <a:latin typeface="Courier New" panose="02070309020205020404" pitchFamily="49" charset="0"/>
+                <a:cs typeface="Courier New" panose="02070309020205020404" pitchFamily="49" charset="0"/>
+              </a:rPr>
+              <a:t>confM$table</a:t>
+            </a:r>
+            <a:r>
+              <a:rPr lang="en-US" b="1" dirty="0">
+                <a:latin typeface="Courier New" panose="02070309020205020404" pitchFamily="49" charset="0"/>
+                <a:cs typeface="Courier New" panose="02070309020205020404" pitchFamily="49" charset="0"/>
+              </a:rPr>
+              <a:t>)</a:t>
+            </a:r>
+          </a:p>
+        </p:txBody>
+      </p:sp>
+    </p:spTree>
+    <p:extLst>
+      <p:ext uri="{BB962C8B-B14F-4D97-AF65-F5344CB8AC3E}">
+        <p14:creationId xmlns:p14="http://schemas.microsoft.com/office/powerpoint/2010/main" val="2227334823"/>
+      </p:ext>
+    </p:extLst>
+  </p:cSld>
+  <p:clrMapOvr>
+    <a:masterClrMapping/>
+  </p:clrMapOvr>
+</p:sld>
+</file>
+
+<file path=ppt/slides/slide11.xml><?xml version="1.0" encoding="utf-8"?>
+<p:sld xmlns:a="http://schemas.openxmlformats.org/drawingml/2006/main" xmlns:r="http://schemas.openxmlformats.org/officeDocument/2006/relationships" xmlns:p="http://schemas.openxmlformats.org/presentationml/2006/main">
   <p:cSld name="page3">
     <p:spTree>
       <p:nvGrpSpPr>
@@ -5685,7 +6285,88 @@
 </p:sld>
 </file>
 
-<file path=ppt/slides/slide11.xml><?xml version="1.0" encoding="utf-8"?>
+<file path=ppt/slides/slide12.xml><?xml version="1.0" encoding="utf-8"?>
+<p:sld xmlns:a="http://schemas.openxmlformats.org/drawingml/2006/main" xmlns:r="http://schemas.openxmlformats.org/officeDocument/2006/relationships" xmlns:p="http://schemas.openxmlformats.org/presentationml/2006/main">
+  <p:cSld>
+    <p:spTree>
+      <p:nvGrpSpPr>
+        <p:cNvPr id="1" name=""/>
+        <p:cNvGrpSpPr/>
+        <p:nvPr/>
+      </p:nvGrpSpPr>
+      <p:grpSpPr>
+        <a:xfrm>
+          <a:off x="0" y="0"/>
+          <a:ext cx="0" cy="0"/>
+          <a:chOff x="0" y="0"/>
+          <a:chExt cx="0" cy="0"/>
+        </a:xfrm>
+      </p:grpSpPr>
+      <p:sp>
+        <p:nvSpPr>
+          <p:cNvPr id="2" name="Titel 1">
+            <a:extLst>
+              <a:ext uri="{FF2B5EF4-FFF2-40B4-BE49-F238E27FC236}">
+                <a16:creationId xmlns:a16="http://schemas.microsoft.com/office/drawing/2014/main" id="{CC44A84B-A8EE-4808-84E4-0ABB51E2D5AB}"/>
+              </a:ext>
+            </a:extLst>
+          </p:cNvPr>
+          <p:cNvSpPr txBox="1">
+            <a:spLocks noGrp="1"/>
+          </p:cNvSpPr>
+          <p:nvPr>
+            <p:ph type="title" idx="4294967295"/>
+          </p:nvPr>
+        </p:nvSpPr>
+        <p:spPr/>
+        <p:txBody>
+          <a:bodyPr/>
+          <a:lstStyle/>
+          <a:p>
+            <a:pPr lvl="0"/>
+            <a:endParaRPr lang="en-US" dirty="0"/>
+          </a:p>
+        </p:txBody>
+      </p:sp>
+      <p:sp>
+        <p:nvSpPr>
+          <p:cNvPr id="3" name="Textplatzhalter 2">
+            <a:extLst>
+              <a:ext uri="{FF2B5EF4-FFF2-40B4-BE49-F238E27FC236}">
+                <a16:creationId xmlns:a16="http://schemas.microsoft.com/office/drawing/2014/main" id="{53DEC8A0-C278-4ECC-AC9D-29E8286C2B63}"/>
+              </a:ext>
+            </a:extLst>
+          </p:cNvPr>
+          <p:cNvSpPr txBox="1">
+            <a:spLocks noGrp="1"/>
+          </p:cNvSpPr>
+          <p:nvPr>
+            <p:ph type="body" idx="4294967295"/>
+          </p:nvPr>
+        </p:nvSpPr>
+        <p:spPr/>
+        <p:txBody>
+          <a:bodyPr/>
+          <a:lstStyle/>
+          <a:p>
+            <a:endParaRPr lang="en-US" dirty="0"/>
+          </a:p>
+        </p:txBody>
+      </p:sp>
+    </p:spTree>
+    <p:extLst>
+      <p:ext uri="{BB962C8B-B14F-4D97-AF65-F5344CB8AC3E}">
+        <p14:creationId xmlns:p14="http://schemas.microsoft.com/office/powerpoint/2010/main" val="2310051511"/>
+      </p:ext>
+    </p:extLst>
+  </p:cSld>
+  <p:clrMapOvr>
+    <a:masterClrMapping/>
+  </p:clrMapOvr>
+</p:sld>
+</file>
+
+<file path=ppt/slides/slide13.xml><?xml version="1.0" encoding="utf-8"?>
 <p:sld xmlns:a="http://schemas.openxmlformats.org/drawingml/2006/main" xmlns:r="http://schemas.openxmlformats.org/officeDocument/2006/relationships" xmlns:p="http://schemas.openxmlformats.org/presentationml/2006/main">
   <p:cSld>
     <p:spTree>
@@ -5854,7 +6535,7 @@
 </p:sld>
 </file>
 
-<file path=ppt/slides/slide12.xml><?xml version="1.0" encoding="utf-8"?>
+<file path=ppt/slides/slide14.xml><?xml version="1.0" encoding="utf-8"?>
 <p:sld xmlns:a="http://schemas.openxmlformats.org/drawingml/2006/main" xmlns:r="http://schemas.openxmlformats.org/officeDocument/2006/relationships" xmlns:p="http://schemas.openxmlformats.org/presentationml/2006/main">
   <p:cSld>
     <p:spTree>
@@ -7049,7 +7730,7 @@
             </a:pPr>
             <a:r>
               <a:rPr lang="en-US" dirty="0"/>
-              <a:t>BP algorithm straightforward:</a:t>
+              <a:t>BP algorithm, straightforward:</a:t>
             </a:r>
             <a:endParaRPr lang="de-CH" dirty="0"/>
           </a:p>
@@ -7145,7 +7826,7 @@
             </a:pPr>
             <a:r>
               <a:rPr lang="en-US" dirty="0"/>
-              <a:t>cost matrix straightforward:</a:t>
+              <a:t>cost matrix, straightforward:</a:t>
             </a:r>
             <a:endParaRPr lang="de-CH" dirty="0"/>
           </a:p>
@@ -7295,7 +7976,7 @@
             </a:pPr>
             <a:r>
               <a:rPr lang="en-US" dirty="0"/>
-              <a:t>Results:</a:t>
+              <a:t>Results grid search #1:</a:t>
             </a:r>
           </a:p>
           <a:p>
@@ -7593,7 +8274,7 @@
             </a:pPr>
             <a:r>
               <a:rPr lang="en-US" dirty="0"/>
-              <a:t>Results cont’d:</a:t>
+              <a:t>Results grid search #2:</a:t>
             </a:r>
           </a:p>
           <a:p>
@@ -7602,24 +8283,22 @@
               <a:buChar char="à"/>
             </a:pPr>
             <a:r>
-              <a:rPr lang="en-US" dirty="0"/>
-              <a:t>hyperparameters: k = 7, </a:t>
-            </a:r>
-            <a:r>
-              <a:rPr lang="en-US" dirty="0" err="1"/>
-              <a:t>c_n</a:t>
-            </a:r>
-            <a:r>
-              <a:rPr lang="en-US" dirty="0"/>
-              <a:t> = 3, </a:t>
-            </a:r>
-            <a:r>
-              <a:rPr lang="en-US" dirty="0" err="1"/>
-              <a:t>c_e</a:t>
-            </a:r>
-            <a:r>
-              <a:rPr lang="en-US" dirty="0"/>
-              <a:t> = 2</a:t>
+              <a:rPr lang="de-CH" dirty="0">
+                <a:sym typeface="Wingdings" panose="05000000000000000000" pitchFamily="2" charset="2"/>
+              </a:rPr>
+              <a:t>Best </a:t>
+            </a:r>
+            <a:r>
+              <a:rPr lang="de-CH" dirty="0" err="1">
+                <a:sym typeface="Wingdings" panose="05000000000000000000" pitchFamily="2" charset="2"/>
+              </a:rPr>
+              <a:t>parameters</a:t>
+            </a:r>
+            <a:r>
+              <a:rPr lang="de-CH" dirty="0">
+                <a:sym typeface="Wingdings" panose="05000000000000000000" pitchFamily="2" charset="2"/>
+              </a:rPr>
+              <a:t>:</a:t>
             </a:r>
           </a:p>
           <a:p>
@@ -7628,27 +8307,86 @@
               <a:buChar char="à"/>
             </a:pPr>
             <a:r>
-              <a:rPr lang="de-CH" dirty="0"/>
-              <a:t>a</a:t>
-            </a:r>
-            <a:r>
-              <a:rPr lang="en-US" dirty="0" err="1"/>
-              <a:t>ccuracy</a:t>
-            </a:r>
-            <a:r>
-              <a:rPr lang="en-US" dirty="0"/>
-              <a:t> on valid.txt: 99.6%</a:t>
-            </a:r>
-          </a:p>
-          <a:p>
-            <a:pPr marL="457200" indent="-457200">
-              <a:buFontTx/>
-              <a:buChar char="-"/>
+              <a:rPr lang="de-CH" dirty="0">
+                <a:sym typeface="Wingdings" panose="05000000000000000000" pitchFamily="2" charset="2"/>
+              </a:rPr>
+              <a:t>175 </a:t>
+            </a:r>
+            <a:r>
+              <a:rPr lang="de-CH" dirty="0" err="1">
+                <a:sym typeface="Wingdings" panose="05000000000000000000" pitchFamily="2" charset="2"/>
+              </a:rPr>
+              <a:t>combinations</a:t>
+            </a:r>
+            <a:r>
+              <a:rPr lang="de-CH" dirty="0">
+                <a:sym typeface="Wingdings" panose="05000000000000000000" pitchFamily="2" charset="2"/>
+              </a:rPr>
+              <a:t> </a:t>
+            </a:r>
+            <a:r>
+              <a:rPr lang="de-CH" dirty="0" err="1">
+                <a:sym typeface="Wingdings" panose="05000000000000000000" pitchFamily="2" charset="2"/>
+              </a:rPr>
+              <a:t>of</a:t>
+            </a:r>
+            <a:r>
+              <a:rPr lang="de-CH" dirty="0">
+                <a:sym typeface="Wingdings" panose="05000000000000000000" pitchFamily="2" charset="2"/>
+              </a:rPr>
+              <a:t> k, </a:t>
+            </a:r>
+            <a:r>
+              <a:rPr lang="de-CH" dirty="0" err="1">
+                <a:sym typeface="Wingdings" panose="05000000000000000000" pitchFamily="2" charset="2"/>
+              </a:rPr>
+              <a:t>c_n</a:t>
+            </a:r>
+            <a:r>
+              <a:rPr lang="de-CH" dirty="0">
+                <a:sym typeface="Wingdings" panose="05000000000000000000" pitchFamily="2" charset="2"/>
+              </a:rPr>
+              <a:t>, </a:t>
+            </a:r>
+            <a:r>
+              <a:rPr lang="de-CH" dirty="0" err="1">
+                <a:sym typeface="Wingdings" panose="05000000000000000000" pitchFamily="2" charset="2"/>
+              </a:rPr>
+              <a:t>c_e</a:t>
+            </a:r>
+            <a:r>
+              <a:rPr lang="de-CH" dirty="0">
+                <a:sym typeface="Wingdings" panose="05000000000000000000" pitchFamily="2" charset="2"/>
+              </a:rPr>
+              <a:t> </a:t>
+            </a:r>
+            <a:r>
+              <a:rPr lang="de-CH" dirty="0" err="1">
+                <a:sym typeface="Wingdings" panose="05000000000000000000" pitchFamily="2" charset="2"/>
+              </a:rPr>
+              <a:t>yield</a:t>
+            </a:r>
+            <a:r>
+              <a:rPr lang="de-CH" dirty="0">
+                <a:sym typeface="Wingdings" panose="05000000000000000000" pitchFamily="2" charset="2"/>
+              </a:rPr>
+              <a:t> 99.6% </a:t>
+            </a:r>
+            <a:r>
+              <a:rPr lang="de-CH" dirty="0" err="1">
+                <a:sym typeface="Wingdings" panose="05000000000000000000" pitchFamily="2" charset="2"/>
+              </a:rPr>
+              <a:t>accuracy</a:t>
+            </a:r>
+            <a:endParaRPr lang="de-CH" dirty="0">
+              <a:sym typeface="Wingdings" panose="05000000000000000000" pitchFamily="2" charset="2"/>
+            </a:endParaRPr>
+          </a:p>
+          <a:p>
+            <a:pPr lvl="1" indent="0">
+              <a:buNone/>
             </a:pPr>
-            <a:endParaRPr lang="en-US" dirty="0"/>
-          </a:p>
-          <a:p>
-            <a:endParaRPr lang="en-US" dirty="0"/>
+            <a:endParaRPr lang="de-CH" dirty="0"/>
           </a:p>
         </p:txBody>
       </p:sp>
@@ -7708,10 +8446,10 @@
       </p:sp>
       <p:pic>
         <p:nvPicPr>
-          <p:cNvPr id="4" name="Grafik 3">
-            <a:extLst>
-              <a:ext uri="{FF2B5EF4-FFF2-40B4-BE49-F238E27FC236}">
-                <a16:creationId xmlns:a16="http://schemas.microsoft.com/office/drawing/2014/main" id="{A9385369-AC63-44FF-BEAD-6883BEC94279}"/>
+          <p:cNvPr id="2" name="Grafik 1">
+            <a:extLst>
+              <a:ext uri="{FF2B5EF4-FFF2-40B4-BE49-F238E27FC236}">
+                <a16:creationId xmlns:a16="http://schemas.microsoft.com/office/drawing/2014/main" id="{2EC24A9E-B176-42A9-9CD7-9FB74EE01E5C}"/>
               </a:ext>
             </a:extLst>
           </p:cNvPr>
@@ -7721,179 +8459,25 @@
           <p:nvPr/>
         </p:nvPicPr>
         <p:blipFill>
-          <a:blip r:embed="rId3">
-            <a:extLst>
-              <a:ext uri="{28A0092B-C50C-407E-A947-70E740481C1C}">
-                <a14:useLocalDpi xmlns:a14="http://schemas.microsoft.com/office/drawing/2010/main" val="0"/>
-              </a:ext>
-            </a:extLst>
-          </a:blip>
+          <a:blip r:embed="rId3"/>
           <a:stretch>
             <a:fillRect/>
           </a:stretch>
         </p:blipFill>
         <p:spPr>
           <a:xfrm>
-            <a:off x="5357092" y="3390654"/>
-            <a:ext cx="4620270" cy="3924848"/>
+            <a:off x="2952628" y="3095955"/>
+            <a:ext cx="4175367" cy="4162400"/>
           </a:xfrm>
           <a:prstGeom prst="rect">
             <a:avLst/>
           </a:prstGeom>
         </p:spPr>
       </p:pic>
-      <p:sp>
-        <p:nvSpPr>
-          <p:cNvPr id="6" name="Textfeld 5">
-            <a:extLst>
-              <a:ext uri="{FF2B5EF4-FFF2-40B4-BE49-F238E27FC236}">
-                <a16:creationId xmlns:a16="http://schemas.microsoft.com/office/drawing/2014/main" id="{2DEF6A6B-9E60-4528-9C00-C2C5FA8F4B7D}"/>
-              </a:ext>
-            </a:extLst>
-          </p:cNvPr>
-          <p:cNvSpPr txBox="1"/>
-          <p:nvPr/>
-        </p:nvSpPr>
-        <p:spPr>
-          <a:xfrm>
-            <a:off x="171451" y="3382259"/>
-            <a:ext cx="5129212" cy="3416320"/>
-          </a:xfrm>
-          <a:prstGeom prst="rect">
-            <a:avLst/>
-          </a:prstGeom>
-          <a:solidFill>
-            <a:srgbClr val="FFC000"/>
-          </a:solidFill>
-        </p:spPr>
-        <p:txBody>
-          <a:bodyPr wrap="square" rtlCol="0">
-            <a:spAutoFit/>
-          </a:bodyPr>
-          <a:lstStyle/>
-          <a:p>
-            <a:r>
-              <a:rPr lang="pt-BR" b="1" dirty="0">
-                <a:latin typeface="Courier New" panose="02070309020205020404" pitchFamily="49" charset="0"/>
-                <a:cs typeface="Courier New" panose="02070309020205020404" pitchFamily="49" charset="0"/>
-              </a:rPr>
-              <a:t>&gt; confusionMatrix(t, dnn=c("Prediction", "Ground truth"))</a:t>
-            </a:r>
-          </a:p>
-          <a:p>
-            <a:r>
-              <a:rPr lang="pt-BR" b="1" dirty="0">
-                <a:latin typeface="Courier New" panose="02070309020205020404" pitchFamily="49" charset="0"/>
-                <a:cs typeface="Courier New" panose="02070309020205020404" pitchFamily="49" charset="0"/>
-              </a:rPr>
-              <a:t>Confusion Matrix and Statistics</a:t>
-            </a:r>
-          </a:p>
-          <a:p>
-            <a:r>
-              <a:rPr lang="pt-BR" b="1" dirty="0">
-                <a:latin typeface="Courier New" panose="02070309020205020404" pitchFamily="49" charset="0"/>
-                <a:cs typeface="Courier New" panose="02070309020205020404" pitchFamily="49" charset="0"/>
-              </a:rPr>
-              <a:t>                                </a:t>
-            </a:r>
-          </a:p>
-          <a:p>
-            <a:r>
-              <a:rPr lang="pt-BR" b="1" dirty="0">
-                <a:latin typeface="Courier New" panose="02070309020205020404" pitchFamily="49" charset="0"/>
-                <a:cs typeface="Courier New" panose="02070309020205020404" pitchFamily="49" charset="0"/>
-              </a:rPr>
-              <a:t>                classIdActual</a:t>
-            </a:r>
-          </a:p>
-          <a:p>
-            <a:r>
-              <a:rPr lang="pt-BR" b="1" dirty="0">
-                <a:latin typeface="Courier New" panose="02070309020205020404" pitchFamily="49" charset="0"/>
-                <a:cs typeface="Courier New" panose="02070309020205020404" pitchFamily="49" charset="0"/>
-              </a:rPr>
-              <a:t>classIdPredicted   a   i</a:t>
-            </a:r>
-          </a:p>
-          <a:p>
-            <a:r>
-              <a:rPr lang="pt-BR" b="1" dirty="0">
-                <a:latin typeface="Courier New" panose="02070309020205020404" pitchFamily="49" charset="0"/>
-                <a:cs typeface="Courier New" panose="02070309020205020404" pitchFamily="49" charset="0"/>
-              </a:rPr>
-              <a:t>               a  49   0</a:t>
-            </a:r>
-          </a:p>
-          <a:p>
-            <a:r>
-              <a:rPr lang="pt-BR" b="1" dirty="0">
-                <a:latin typeface="Courier New" panose="02070309020205020404" pitchFamily="49" charset="0"/>
-                <a:cs typeface="Courier New" panose="02070309020205020404" pitchFamily="49" charset="0"/>
-              </a:rPr>
-              <a:t>               i   1 200</a:t>
-            </a:r>
-          </a:p>
-          <a:p>
-            <a:endParaRPr lang="pt-BR" b="1" dirty="0">
-              <a:latin typeface="Courier New" panose="02070309020205020404" pitchFamily="49" charset="0"/>
-              <a:cs typeface="Courier New" panose="02070309020205020404" pitchFamily="49" charset="0"/>
-            </a:endParaRPr>
-          </a:p>
-          <a:p>
-            <a:r>
-              <a:rPr lang="pt-BR" b="1" dirty="0">
-                <a:latin typeface="Courier New" panose="02070309020205020404" pitchFamily="49" charset="0"/>
-                <a:cs typeface="Courier New" panose="02070309020205020404" pitchFamily="49" charset="0"/>
-              </a:rPr>
-              <a:t>		  Accuracy : 0.996 </a:t>
-            </a:r>
-          </a:p>
-          <a:p>
-            <a:r>
-              <a:rPr lang="pt-BR" b="1" dirty="0">
-                <a:latin typeface="Courier New" panose="02070309020205020404" pitchFamily="49" charset="0"/>
-                <a:cs typeface="Courier New" panose="02070309020205020404" pitchFamily="49" charset="0"/>
-              </a:rPr>
-              <a:t>               ....</a:t>
-            </a:r>
-          </a:p>
-          <a:p>
-            <a:r>
-              <a:rPr lang="en-US" b="1" dirty="0" err="1">
-                <a:latin typeface="Courier New" panose="02070309020205020404" pitchFamily="49" charset="0"/>
-                <a:cs typeface="Courier New" panose="02070309020205020404" pitchFamily="49" charset="0"/>
-              </a:rPr>
-              <a:t>fourfoldplot</a:t>
-            </a:r>
-            <a:r>
-              <a:rPr lang="en-US" b="1" dirty="0">
-                <a:latin typeface="Courier New" panose="02070309020205020404" pitchFamily="49" charset="0"/>
-                <a:cs typeface="Courier New" panose="02070309020205020404" pitchFamily="49" charset="0"/>
-              </a:rPr>
-              <a:t>(</a:t>
-            </a:r>
-            <a:r>
-              <a:rPr lang="en-US" b="1" dirty="0" err="1">
-                <a:latin typeface="Courier New" panose="02070309020205020404" pitchFamily="49" charset="0"/>
-                <a:cs typeface="Courier New" panose="02070309020205020404" pitchFamily="49" charset="0"/>
-              </a:rPr>
-              <a:t>confM$table</a:t>
-            </a:r>
-            <a:r>
-              <a:rPr lang="en-US" b="1" dirty="0">
-                <a:latin typeface="Courier New" panose="02070309020205020404" pitchFamily="49" charset="0"/>
-                <a:cs typeface="Courier New" panose="02070309020205020404" pitchFamily="49" charset="0"/>
-              </a:rPr>
-              <a:t>)</a:t>
-            </a:r>
-          </a:p>
-        </p:txBody>
-      </p:sp>
     </p:spTree>
     <p:extLst>
       <p:ext uri="{BB962C8B-B14F-4D97-AF65-F5344CB8AC3E}">
-        <p14:creationId xmlns:p14="http://schemas.microsoft.com/office/powerpoint/2010/main" val="2227334823"/>
+        <p14:creationId xmlns:p14="http://schemas.microsoft.com/office/powerpoint/2010/main" val="121370370"/>
       </p:ext>
     </p:extLst>
   </p:cSld>

</xml_diff>